<commit_message>
Atualiza apresentações, aumentando fonte e exibindo apenas um bullet por vez
</commit_message>
<xml_diff>
--- a/projects/05-websocket-chat-nodejs/websocket.pptx
+++ b/projects/05-websocket-chat-nodejs/websocket.pptx
@@ -8,7 +8,8 @@
     <p:sldId id="257" r:id="rId2"/>
     <p:sldId id="259" r:id="rId3"/>
     <p:sldId id="258" r:id="rId4"/>
-    <p:sldId id="256" r:id="rId5"/>
+    <p:sldId id="260" r:id="rId5"/>
+    <p:sldId id="256" r:id="rId6"/>
   </p:sldIdLst>
   <p:sldSz cx="12192000" cy="6858000"/>
   <p:notesSz cx="6858000" cy="9144000"/>
@@ -270,7 +271,7 @@
           <a:p>
             <a:fld id="{A74A3E01-8C82-1244-BAF0-CA56415AE545}" type="datetimeFigureOut">
               <a:rPr lang="pt-BR" smtClean="0"/>
-              <a:t>15/11/2018</a:t>
+              <a:t>03/12/2018</a:t>
             </a:fld>
             <a:endParaRPr lang="pt-BR"/>
           </a:p>
@@ -440,7 +441,7 @@
           <a:p>
             <a:fld id="{A74A3E01-8C82-1244-BAF0-CA56415AE545}" type="datetimeFigureOut">
               <a:rPr lang="pt-BR" smtClean="0"/>
-              <a:t>15/11/2018</a:t>
+              <a:t>03/12/2018</a:t>
             </a:fld>
             <a:endParaRPr lang="pt-BR"/>
           </a:p>
@@ -620,7 +621,7 @@
           <a:p>
             <a:fld id="{A74A3E01-8C82-1244-BAF0-CA56415AE545}" type="datetimeFigureOut">
               <a:rPr lang="pt-BR" smtClean="0"/>
-              <a:t>15/11/2018</a:t>
+              <a:t>03/12/2018</a:t>
             </a:fld>
             <a:endParaRPr lang="pt-BR"/>
           </a:p>
@@ -790,7 +791,7 @@
           <a:p>
             <a:fld id="{A74A3E01-8C82-1244-BAF0-CA56415AE545}" type="datetimeFigureOut">
               <a:rPr lang="pt-BR" smtClean="0"/>
-              <a:t>15/11/2018</a:t>
+              <a:t>03/12/2018</a:t>
             </a:fld>
             <a:endParaRPr lang="pt-BR"/>
           </a:p>
@@ -1050,7 +1051,7 @@
           <a:p>
             <a:fld id="{A74A3E01-8C82-1244-BAF0-CA56415AE545}" type="datetimeFigureOut">
               <a:rPr lang="pt-BR" smtClean="0"/>
-              <a:t>15/11/2018</a:t>
+              <a:t>03/12/2018</a:t>
             </a:fld>
             <a:endParaRPr lang="pt-BR"/>
           </a:p>
@@ -1282,7 +1283,7 @@
           <a:p>
             <a:fld id="{A74A3E01-8C82-1244-BAF0-CA56415AE545}" type="datetimeFigureOut">
               <a:rPr lang="pt-BR" smtClean="0"/>
-              <a:t>15/11/2018</a:t>
+              <a:t>03/12/2018</a:t>
             </a:fld>
             <a:endParaRPr lang="pt-BR"/>
           </a:p>
@@ -1637,7 +1638,7 @@
           <a:p>
             <a:fld id="{A74A3E01-8C82-1244-BAF0-CA56415AE545}" type="datetimeFigureOut">
               <a:rPr lang="pt-BR" smtClean="0"/>
-              <a:t>15/11/2018</a:t>
+              <a:t>03/12/2018</a:t>
             </a:fld>
             <a:endParaRPr lang="pt-BR"/>
           </a:p>
@@ -1778,7 +1779,7 @@
           <a:p>
             <a:fld id="{A74A3E01-8C82-1244-BAF0-CA56415AE545}" type="datetimeFigureOut">
               <a:rPr lang="pt-BR" smtClean="0"/>
-              <a:t>15/11/2018</a:t>
+              <a:t>03/12/2018</a:t>
             </a:fld>
             <a:endParaRPr lang="pt-BR"/>
           </a:p>
@@ -1873,7 +1874,7 @@
           <a:p>
             <a:fld id="{A74A3E01-8C82-1244-BAF0-CA56415AE545}" type="datetimeFigureOut">
               <a:rPr lang="pt-BR" smtClean="0"/>
-              <a:t>15/11/2018</a:t>
+              <a:t>03/12/2018</a:t>
             </a:fld>
             <a:endParaRPr lang="pt-BR"/>
           </a:p>
@@ -2230,7 +2231,7 @@
           <a:p>
             <a:fld id="{A74A3E01-8C82-1244-BAF0-CA56415AE545}" type="datetimeFigureOut">
               <a:rPr lang="pt-BR" smtClean="0"/>
-              <a:t>15/11/2018</a:t>
+              <a:t>03/12/2018</a:t>
             </a:fld>
             <a:endParaRPr lang="pt-BR"/>
           </a:p>
@@ -2548,7 +2549,7 @@
           <a:p>
             <a:fld id="{A74A3E01-8C82-1244-BAF0-CA56415AE545}" type="datetimeFigureOut">
               <a:rPr lang="pt-BR" smtClean="0"/>
-              <a:t>15/11/2018</a:t>
+              <a:t>03/12/2018</a:t>
             </a:fld>
             <a:endParaRPr lang="pt-BR"/>
           </a:p>
@@ -2792,7 +2793,7 @@
           <a:p>
             <a:fld id="{A74A3E01-8C82-1244-BAF0-CA56415AE545}" type="datetimeFigureOut">
               <a:rPr lang="pt-BR" smtClean="0"/>
-              <a:t>15/11/2018</a:t>
+              <a:t>03/12/2018</a:t>
             </a:fld>
             <a:endParaRPr lang="pt-BR"/>
           </a:p>
@@ -3502,124 +3503,6 @@
             </a:r>
             <a:endParaRPr lang="en-US" sz="3200" dirty="0"/>
           </a:p>
-          <a:p>
-            <a:r>
-              <a:rPr lang="en-US" sz="3200" dirty="0"/>
-              <a:t>Como o </a:t>
-            </a:r>
-            <a:r>
-              <a:rPr lang="en-US" sz="3200" dirty="0" err="1"/>
-              <a:t>cabeçalho</a:t>
-            </a:r>
-            <a:r>
-              <a:rPr lang="en-US" sz="3200" dirty="0"/>
-              <a:t> e </a:t>
-            </a:r>
-            <a:r>
-              <a:rPr lang="en-US" sz="3200" dirty="0" err="1"/>
-              <a:t>corpo</a:t>
-            </a:r>
-            <a:r>
-              <a:rPr lang="en-US" sz="3200" dirty="0"/>
-              <a:t> das </a:t>
-            </a:r>
-            <a:r>
-              <a:rPr lang="en-US" sz="3200" dirty="0" err="1"/>
-              <a:t>mensagens</a:t>
-            </a:r>
-            <a:r>
-              <a:rPr lang="en-US" sz="3200" dirty="0"/>
-              <a:t> HTTP </a:t>
-            </a:r>
-            <a:r>
-              <a:rPr lang="en-US" sz="3200" dirty="0" err="1"/>
-              <a:t>são</a:t>
-            </a:r>
-            <a:r>
-              <a:rPr lang="en-US" sz="3200" dirty="0"/>
-              <a:t> </a:t>
-            </a:r>
-            <a:r>
-              <a:rPr lang="en-US" sz="3200" dirty="0" err="1"/>
-              <a:t>longos</a:t>
-            </a:r>
-            <a:r>
-              <a:rPr lang="en-US" sz="3200" dirty="0"/>
-              <a:t>, </a:t>
-            </a:r>
-            <a:r>
-              <a:rPr lang="en-US" sz="3200" dirty="0" err="1"/>
-              <a:t>após</a:t>
-            </a:r>
-            <a:r>
-              <a:rPr lang="en-US" sz="3200" dirty="0"/>
-              <a:t> a </a:t>
-            </a:r>
-            <a:r>
-              <a:rPr lang="en-US" sz="3200" dirty="0" err="1"/>
-              <a:t>conexão</a:t>
-            </a:r>
-            <a:r>
-              <a:rPr lang="en-US" sz="3200" dirty="0"/>
-              <a:t> </a:t>
-            </a:r>
-            <a:r>
-              <a:rPr lang="en-US" sz="3200" dirty="0" err="1"/>
-              <a:t>ser</a:t>
-            </a:r>
-            <a:r>
-              <a:rPr lang="en-US" sz="3200" dirty="0"/>
-              <a:t> </a:t>
-            </a:r>
-            <a:r>
-              <a:rPr lang="en-US" sz="3200" dirty="0" err="1"/>
-              <a:t>estabelecida</a:t>
-            </a:r>
-            <a:r>
-              <a:rPr lang="en-US" sz="3200" dirty="0"/>
-              <a:t>, </a:t>
-            </a:r>
-            <a:r>
-              <a:rPr lang="en-US" sz="3200" dirty="0" err="1"/>
-              <a:t>mensagens</a:t>
-            </a:r>
-            <a:r>
-              <a:rPr lang="en-US" sz="3200" dirty="0"/>
-              <a:t> HTTP </a:t>
-            </a:r>
-            <a:r>
-              <a:rPr lang="en-US" sz="3200" dirty="0" err="1"/>
-              <a:t>não</a:t>
-            </a:r>
-            <a:r>
-              <a:rPr lang="en-US" sz="3200" dirty="0"/>
-              <a:t> </a:t>
-            </a:r>
-            <a:r>
-              <a:rPr lang="en-US" sz="3200" dirty="0" err="1"/>
-              <a:t>são</a:t>
-            </a:r>
-            <a:r>
-              <a:rPr lang="en-US" sz="3200" dirty="0"/>
-              <a:t> </a:t>
-            </a:r>
-            <a:r>
-              <a:rPr lang="en-US" sz="3200" dirty="0" err="1"/>
-              <a:t>mais</a:t>
-            </a:r>
-            <a:r>
-              <a:rPr lang="en-US" sz="3200" dirty="0"/>
-              <a:t> </a:t>
-            </a:r>
-            <a:r>
-              <a:rPr lang="en-US" sz="3200" dirty="0" err="1"/>
-              <a:t>enviadas</a:t>
-            </a:r>
-            <a:endParaRPr lang="en-US" sz="3200" dirty="0"/>
-          </a:p>
-          <a:p>
-            <a:endParaRPr lang="pt-BR" sz="3200" dirty="0"/>
-          </a:p>
         </p:txBody>
       </p:sp>
       <p:sp>
@@ -3791,14 +3674,57 @@
                             </p:stCondLst>
                             <p:childTnLst>
                               <p:par>
-                                <p:cTn id="10" presetID="9" presetClass="entr" presetSubtype="0" fill="hold" grpId="0" nodeType="clickEffect">
+                                <p:cTn id="10" presetID="9" presetClass="exit" presetSubtype="0" fill="hold" grpId="1" nodeType="clickEffect">
+                                  <p:stCondLst>
+                                    <p:cond delay="0"/>
+                                  </p:stCondLst>
+                                  <p:childTnLst>
+                                    <p:animEffect transition="out" filter="dissolve">
+                                      <p:cBhvr>
+                                        <p:cTn id="11" dur="500"/>
+                                        <p:tgtEl>
+                                          <p:spTgt spid="3">
+                                            <p:txEl>
+                                              <p:pRg st="0" end="0"/>
+                                            </p:txEl>
+                                          </p:spTgt>
+                                        </p:tgtEl>
+                                      </p:cBhvr>
+                                    </p:animEffect>
+                                    <p:set>
+                                      <p:cBhvr>
+                                        <p:cTn id="12" dur="1" fill="hold">
+                                          <p:stCondLst>
+                                            <p:cond delay="499"/>
+                                          </p:stCondLst>
+                                        </p:cTn>
+                                        <p:tgtEl>
+                                          <p:spTgt spid="3">
+                                            <p:txEl>
+                                              <p:pRg st="0" end="0"/>
+                                            </p:txEl>
+                                          </p:spTgt>
+                                        </p:tgtEl>
+                                        <p:attrNameLst>
+                                          <p:attrName>style.visibility</p:attrName>
+                                        </p:attrNameLst>
+                                      </p:cBhvr>
+                                      <p:to>
+                                        <p:strVal val="hidden"/>
+                                      </p:to>
+                                    </p:set>
+                                  </p:childTnLst>
+                                </p:cTn>
+                              </p:par>
+                              <p:par>
+                                <p:cTn id="13" presetID="9" presetClass="entr" presetSubtype="0" fill="hold" grpId="0" nodeType="withEffect">
                                   <p:stCondLst>
                                     <p:cond delay="0"/>
                                   </p:stCondLst>
                                   <p:childTnLst>
                                     <p:set>
                                       <p:cBhvr>
-                                        <p:cTn id="11" dur="1" fill="hold">
+                                        <p:cTn id="14" dur="1" fill="hold">
                                           <p:stCondLst>
                                             <p:cond delay="0"/>
                                           </p:stCondLst>
@@ -3820,7 +3746,7 @@
                                     </p:set>
                                     <p:animEffect transition="in" filter="dissolve">
                                       <p:cBhvr>
-                                        <p:cTn id="12" dur="500"/>
+                                        <p:cTn id="15" dur="500"/>
                                         <p:tgtEl>
                                           <p:spTgt spid="3">
                                             <p:txEl>
@@ -3840,26 +3766,69 @@
                     </p:cTn>
                   </p:par>
                   <p:par>
-                    <p:cTn id="13" fill="hold">
+                    <p:cTn id="16" fill="hold">
                       <p:stCondLst>
                         <p:cond delay="indefinite"/>
                       </p:stCondLst>
                       <p:childTnLst>
                         <p:par>
-                          <p:cTn id="14" fill="hold">
+                          <p:cTn id="17" fill="hold">
                             <p:stCondLst>
                               <p:cond delay="0"/>
                             </p:stCondLst>
                             <p:childTnLst>
                               <p:par>
-                                <p:cTn id="15" presetID="9" presetClass="entr" presetSubtype="0" fill="hold" grpId="0" nodeType="clickEffect">
+                                <p:cTn id="18" presetID="9" presetClass="exit" presetSubtype="0" fill="hold" grpId="1" nodeType="clickEffect">
+                                  <p:stCondLst>
+                                    <p:cond delay="0"/>
+                                  </p:stCondLst>
+                                  <p:childTnLst>
+                                    <p:animEffect transition="out" filter="dissolve">
+                                      <p:cBhvr>
+                                        <p:cTn id="19" dur="500"/>
+                                        <p:tgtEl>
+                                          <p:spTgt spid="3">
+                                            <p:txEl>
+                                              <p:pRg st="1" end="1"/>
+                                            </p:txEl>
+                                          </p:spTgt>
+                                        </p:tgtEl>
+                                      </p:cBhvr>
+                                    </p:animEffect>
+                                    <p:set>
+                                      <p:cBhvr>
+                                        <p:cTn id="20" dur="1" fill="hold">
+                                          <p:stCondLst>
+                                            <p:cond delay="499"/>
+                                          </p:stCondLst>
+                                        </p:cTn>
+                                        <p:tgtEl>
+                                          <p:spTgt spid="3">
+                                            <p:txEl>
+                                              <p:pRg st="1" end="1"/>
+                                            </p:txEl>
+                                          </p:spTgt>
+                                        </p:tgtEl>
+                                        <p:attrNameLst>
+                                          <p:attrName>style.visibility</p:attrName>
+                                        </p:attrNameLst>
+                                      </p:cBhvr>
+                                      <p:to>
+                                        <p:strVal val="hidden"/>
+                                      </p:to>
+                                    </p:set>
+                                  </p:childTnLst>
+                                </p:cTn>
+                              </p:par>
+                              <p:par>
+                                <p:cTn id="21" presetID="9" presetClass="entr" presetSubtype="0" fill="hold" grpId="0" nodeType="withEffect">
                                   <p:stCondLst>
                                     <p:cond delay="0"/>
                                   </p:stCondLst>
                                   <p:childTnLst>
                                     <p:set>
                                       <p:cBhvr>
-                                        <p:cTn id="16" dur="1" fill="hold">
+                                        <p:cTn id="22" dur="1" fill="hold">
                                           <p:stCondLst>
                                             <p:cond delay="0"/>
                                           </p:stCondLst>
@@ -3881,72 +3850,11 @@
                                     </p:set>
                                     <p:animEffect transition="in" filter="dissolve">
                                       <p:cBhvr>
-                                        <p:cTn id="17" dur="500"/>
+                                        <p:cTn id="23" dur="500"/>
                                         <p:tgtEl>
                                           <p:spTgt spid="3">
                                             <p:txEl>
                                               <p:pRg st="2" end="2"/>
-                                            </p:txEl>
-                                          </p:spTgt>
-                                        </p:tgtEl>
-                                      </p:cBhvr>
-                                    </p:animEffect>
-                                  </p:childTnLst>
-                                </p:cTn>
-                              </p:par>
-                            </p:childTnLst>
-                          </p:cTn>
-                        </p:par>
-                      </p:childTnLst>
-                    </p:cTn>
-                  </p:par>
-                  <p:par>
-                    <p:cTn id="18" fill="hold">
-                      <p:stCondLst>
-                        <p:cond delay="indefinite"/>
-                      </p:stCondLst>
-                      <p:childTnLst>
-                        <p:par>
-                          <p:cTn id="19" fill="hold">
-                            <p:stCondLst>
-                              <p:cond delay="0"/>
-                            </p:stCondLst>
-                            <p:childTnLst>
-                              <p:par>
-                                <p:cTn id="20" presetID="9" presetClass="entr" presetSubtype="0" fill="hold" grpId="0" nodeType="clickEffect">
-                                  <p:stCondLst>
-                                    <p:cond delay="0"/>
-                                  </p:stCondLst>
-                                  <p:childTnLst>
-                                    <p:set>
-                                      <p:cBhvr>
-                                        <p:cTn id="21" dur="1" fill="hold">
-                                          <p:stCondLst>
-                                            <p:cond delay="0"/>
-                                          </p:stCondLst>
-                                        </p:cTn>
-                                        <p:tgtEl>
-                                          <p:spTgt spid="3">
-                                            <p:txEl>
-                                              <p:pRg st="3" end="3"/>
-                                            </p:txEl>
-                                          </p:spTgt>
-                                        </p:tgtEl>
-                                        <p:attrNameLst>
-                                          <p:attrName>style.visibility</p:attrName>
-                                        </p:attrNameLst>
-                                      </p:cBhvr>
-                                      <p:to>
-                                        <p:strVal val="visible"/>
-                                      </p:to>
-                                    </p:set>
-                                    <p:animEffect transition="in" filter="dissolve">
-                                      <p:cBhvr>
-                                        <p:cTn id="22" dur="500"/>
-                                        <p:tgtEl>
-                                          <p:spTgt spid="3">
-                                            <p:txEl>
-                                              <p:pRg st="3" end="3"/>
                                             </p:txEl>
                                           </p:spTgt>
                                         </p:tgtEl>
@@ -3983,7 +3891,8 @@
       </p:par>
     </p:tnLst>
     <p:bldLst>
-      <p:bldP spid="3" grpId="0" build="p"/>
+      <p:bldP spid="3" grpId="0" uiExpand="1" build="p"/>
+      <p:bldP spid="3" grpId="1" uiExpand="1" build="p"/>
     </p:bldLst>
   </p:timing>
 </p:sld>
@@ -4035,497 +3944,322 @@
           <a:lstStyle/>
           <a:p>
             <a:r>
-              <a:rPr lang="en-US" sz="2600" dirty="0" err="1"/>
+              <a:rPr lang="en-US" sz="3200" dirty="0"/>
+              <a:t>Como o </a:t>
+            </a:r>
+            <a:r>
+              <a:rPr lang="en-US" sz="3200" dirty="0" err="1"/>
+              <a:t>cabeçalho</a:t>
+            </a:r>
+            <a:r>
+              <a:rPr lang="en-US" sz="3200" dirty="0"/>
+              <a:t> e </a:t>
+            </a:r>
+            <a:r>
+              <a:rPr lang="en-US" sz="3200" dirty="0" err="1"/>
+              <a:t>corpo</a:t>
+            </a:r>
+            <a:r>
+              <a:rPr lang="en-US" sz="3200" dirty="0"/>
+              <a:t> das </a:t>
+            </a:r>
+            <a:r>
+              <a:rPr lang="en-US" sz="3200" dirty="0" err="1"/>
+              <a:t>mensagens</a:t>
+            </a:r>
+            <a:r>
+              <a:rPr lang="en-US" sz="3200" dirty="0"/>
+              <a:t> HTTP </a:t>
+            </a:r>
+            <a:r>
+              <a:rPr lang="en-US" sz="3200" dirty="0" err="1"/>
+              <a:t>são</a:t>
+            </a:r>
+            <a:r>
+              <a:rPr lang="en-US" sz="3200" dirty="0"/>
+              <a:t> </a:t>
+            </a:r>
+            <a:r>
+              <a:rPr lang="en-US" sz="3200" dirty="0" err="1"/>
+              <a:t>longos</a:t>
+            </a:r>
+            <a:r>
+              <a:rPr lang="en-US" sz="3200" dirty="0"/>
+              <a:t>, </a:t>
+            </a:r>
+            <a:r>
+              <a:rPr lang="en-US" sz="3200" dirty="0" err="1"/>
+              <a:t>após</a:t>
+            </a:r>
+            <a:r>
+              <a:rPr lang="en-US" sz="3200" dirty="0"/>
+              <a:t> a </a:t>
+            </a:r>
+            <a:r>
+              <a:rPr lang="en-US" sz="3200" dirty="0" err="1"/>
+              <a:t>conexão</a:t>
+            </a:r>
+            <a:r>
+              <a:rPr lang="en-US" sz="3200" dirty="0"/>
+              <a:t> </a:t>
+            </a:r>
+            <a:r>
+              <a:rPr lang="en-US" sz="3200" dirty="0" err="1"/>
+              <a:t>ser</a:t>
+            </a:r>
+            <a:r>
+              <a:rPr lang="en-US" sz="3200" dirty="0"/>
+              <a:t> </a:t>
+            </a:r>
+            <a:r>
+              <a:rPr lang="en-US" sz="3200" dirty="0" err="1"/>
+              <a:t>estabelecida</a:t>
+            </a:r>
+            <a:r>
+              <a:rPr lang="en-US" sz="3200" dirty="0"/>
+              <a:t>, </a:t>
+            </a:r>
+            <a:r>
+              <a:rPr lang="en-US" sz="3200" dirty="0" err="1"/>
+              <a:t>mensagens</a:t>
+            </a:r>
+            <a:r>
+              <a:rPr lang="en-US" sz="3200" dirty="0"/>
+              <a:t> HTTP </a:t>
+            </a:r>
+            <a:r>
+              <a:rPr lang="en-US" sz="3200" dirty="0" err="1"/>
+              <a:t>não</a:t>
+            </a:r>
+            <a:r>
+              <a:rPr lang="en-US" sz="3200" dirty="0"/>
+              <a:t> </a:t>
+            </a:r>
+            <a:r>
+              <a:rPr lang="en-US" sz="3200" dirty="0" err="1"/>
+              <a:t>são</a:t>
+            </a:r>
+            <a:r>
+              <a:rPr lang="en-US" sz="3200" dirty="0"/>
+              <a:t> </a:t>
+            </a:r>
+            <a:r>
+              <a:rPr lang="en-US" sz="3200" dirty="0" err="1"/>
+              <a:t>mais</a:t>
+            </a:r>
+            <a:r>
+              <a:rPr lang="en-US" sz="3200" dirty="0"/>
+              <a:t> </a:t>
+            </a:r>
+            <a:r>
+              <a:rPr lang="en-US" sz="3200" dirty="0" err="1"/>
+              <a:t>enviadas</a:t>
+            </a:r>
+            <a:endParaRPr lang="en-US" sz="3200" dirty="0"/>
+          </a:p>
+          <a:p>
+            <a:r>
+              <a:rPr lang="en-US" sz="3200" dirty="0" err="1"/>
               <a:t>Após</a:t>
             </a:r>
             <a:r>
-              <a:rPr lang="en-US" sz="2600" dirty="0"/>
+              <a:rPr lang="en-US" sz="3200" dirty="0"/>
               <a:t> </a:t>
             </a:r>
             <a:r>
-              <a:rPr lang="en-US" sz="2600" dirty="0" err="1"/>
+              <a:rPr lang="en-US" sz="3200" dirty="0" err="1"/>
               <a:t>estabelecer</a:t>
             </a:r>
             <a:r>
-              <a:rPr lang="en-US" sz="2600" dirty="0"/>
+              <a:rPr lang="en-US" sz="3200" dirty="0"/>
               <a:t> a </a:t>
             </a:r>
             <a:r>
-              <a:rPr lang="en-US" sz="2600" dirty="0" err="1"/>
+              <a:rPr lang="en-US" sz="3200" dirty="0" err="1"/>
               <a:t>conexão</a:t>
             </a:r>
             <a:r>
-              <a:rPr lang="en-US" sz="2600" dirty="0"/>
+              <a:rPr lang="en-US" sz="3200" dirty="0"/>
               <a:t>, </a:t>
             </a:r>
             <a:r>
-              <a:rPr lang="en-US" sz="2600" dirty="0" err="1"/>
+              <a:rPr lang="en-US" sz="3200" dirty="0" err="1"/>
               <a:t>ela</a:t>
             </a:r>
             <a:r>
-              <a:rPr lang="en-US" sz="2600" dirty="0"/>
+              <a:rPr lang="en-US" sz="3200" dirty="0"/>
               <a:t> </a:t>
             </a:r>
             <a:r>
-              <a:rPr lang="en-US" sz="2600" dirty="0" err="1"/>
+              <a:rPr lang="en-US" sz="3200" dirty="0" err="1"/>
               <a:t>é</a:t>
             </a:r>
             <a:r>
-              <a:rPr lang="en-US" sz="2600" dirty="0"/>
+              <a:rPr lang="en-US" sz="3200" dirty="0"/>
               <a:t> </a:t>
             </a:r>
             <a:r>
-              <a:rPr lang="en-US" sz="2600" dirty="0" err="1"/>
+              <a:rPr lang="en-US" sz="3200" dirty="0" err="1"/>
               <a:t>mantida</a:t>
             </a:r>
             <a:r>
-              <a:rPr lang="en-US" sz="2600" dirty="0"/>
+              <a:rPr lang="en-US" sz="3200" dirty="0"/>
               <a:t> e </a:t>
             </a:r>
             <a:r>
-              <a:rPr lang="en-US" sz="2600" dirty="0" err="1"/>
+              <a:rPr lang="en-US" sz="3200" dirty="0" err="1"/>
               <a:t>é</a:t>
             </a:r>
             <a:r>
-              <a:rPr lang="en-US" sz="2600" dirty="0"/>
+              <a:rPr lang="en-US" sz="3200" dirty="0"/>
               <a:t> </a:t>
             </a:r>
             <a:r>
-              <a:rPr lang="en-US" sz="2600" dirty="0" err="1"/>
+              <a:rPr lang="en-US" sz="3200" dirty="0" err="1"/>
               <a:t>apenas</a:t>
             </a:r>
             <a:r>
-              <a:rPr lang="en-US" sz="2600" dirty="0"/>
+              <a:rPr lang="en-US" sz="3200" dirty="0"/>
               <a:t> </a:t>
             </a:r>
             <a:r>
-              <a:rPr lang="en-US" sz="2600" dirty="0" err="1"/>
+              <a:rPr lang="en-US" sz="3200" dirty="0" err="1"/>
               <a:t>feita</a:t>
             </a:r>
             <a:r>
-              <a:rPr lang="en-US" sz="2600" dirty="0"/>
+              <a:rPr lang="en-US" sz="3200" dirty="0"/>
               <a:t> </a:t>
             </a:r>
             <a:r>
-              <a:rPr lang="en-US" sz="2600" dirty="0" err="1"/>
+              <a:rPr lang="en-US" sz="3200" dirty="0" err="1"/>
               <a:t>troca</a:t>
             </a:r>
             <a:r>
-              <a:rPr lang="en-US" sz="2600" dirty="0"/>
+              <a:rPr lang="en-US" sz="3200" dirty="0"/>
               <a:t> de dados no canal</a:t>
             </a:r>
           </a:p>
           <a:p>
             <a:r>
-              <a:rPr lang="en-US" sz="2600" dirty="0" err="1"/>
+              <a:rPr lang="en-US" sz="3200" dirty="0" err="1"/>
               <a:t>Diferente</a:t>
             </a:r>
             <a:r>
-              <a:rPr lang="en-US" sz="2600" dirty="0"/>
+              <a:rPr lang="en-US" sz="3200" dirty="0"/>
               <a:t> de </a:t>
             </a:r>
             <a:r>
-              <a:rPr lang="en-US" sz="2600" dirty="0" err="1"/>
+              <a:rPr lang="en-US" sz="3200" dirty="0" err="1"/>
               <a:t>requisições</a:t>
             </a:r>
             <a:r>
-              <a:rPr lang="en-US" sz="2600" dirty="0"/>
+              <a:rPr lang="en-US" sz="3200" dirty="0"/>
               <a:t> HTTP que </a:t>
             </a:r>
             <a:r>
-              <a:rPr lang="en-US" sz="2600" dirty="0" err="1"/>
+              <a:rPr lang="en-US" sz="3200" dirty="0" err="1"/>
               <a:t>normalmente</a:t>
             </a:r>
             <a:r>
-              <a:rPr lang="en-US" sz="2600" dirty="0"/>
+              <a:rPr lang="en-US" sz="3200" dirty="0"/>
               <a:t> </a:t>
             </a:r>
             <a:r>
-              <a:rPr lang="en-US" sz="2600" dirty="0" err="1"/>
+              <a:rPr lang="en-US" sz="3200" dirty="0" err="1"/>
               <a:t>requerem</a:t>
             </a:r>
             <a:r>
-              <a:rPr lang="en-US" sz="2600" dirty="0"/>
+              <a:rPr lang="en-US" sz="3200" dirty="0"/>
               <a:t> </a:t>
             </a:r>
             <a:r>
-              <a:rPr lang="en-US" sz="2600" dirty="0" err="1"/>
+              <a:rPr lang="en-US" sz="3200" dirty="0" err="1"/>
               <a:t>uma</a:t>
             </a:r>
             <a:r>
-              <a:rPr lang="en-US" sz="2600" dirty="0"/>
+              <a:rPr lang="en-US" sz="3200" dirty="0"/>
               <a:t> nova </a:t>
             </a:r>
             <a:r>
-              <a:rPr lang="en-US" sz="2600" dirty="0" err="1"/>
+              <a:rPr lang="en-US" sz="3200" dirty="0" err="1"/>
               <a:t>conexão</a:t>
             </a:r>
             <a:r>
-              <a:rPr lang="en-US" sz="2600" dirty="0"/>
+              <a:rPr lang="en-US" sz="3200" dirty="0"/>
               <a:t> a </a:t>
             </a:r>
             <a:r>
-              <a:rPr lang="en-US" sz="2600" dirty="0" err="1"/>
+              <a:rPr lang="en-US" sz="3200" dirty="0" err="1"/>
               <a:t>cada</a:t>
             </a:r>
             <a:r>
-              <a:rPr lang="en-US" sz="2600" dirty="0"/>
+              <a:rPr lang="en-US" sz="3200" dirty="0"/>
               <a:t> </a:t>
             </a:r>
             <a:r>
-              <a:rPr lang="en-US" sz="2600" dirty="0" err="1"/>
+              <a:rPr lang="en-US" sz="3200" dirty="0" err="1"/>
               <a:t>acesso</a:t>
             </a:r>
             <a:r>
-              <a:rPr lang="en-US" sz="2600" dirty="0"/>
+              <a:rPr lang="en-US" sz="3200" dirty="0"/>
               <a:t> (</a:t>
             </a:r>
             <a:r>
-              <a:rPr lang="en-US" sz="2600" dirty="0" err="1"/>
+              <a:rPr lang="en-US" sz="3200" dirty="0" err="1"/>
               <a:t>como</a:t>
             </a:r>
             <a:r>
-              <a:rPr lang="en-US" sz="2600" dirty="0"/>
+              <a:rPr lang="en-US" sz="3200" dirty="0"/>
               <a:t> a </a:t>
             </a:r>
             <a:r>
-              <a:rPr lang="en-US" sz="2600" dirty="0" err="1"/>
+              <a:rPr lang="en-US" sz="3200" dirty="0" err="1"/>
               <a:t>cada</a:t>
             </a:r>
             <a:r>
-              <a:rPr lang="en-US" sz="2600" dirty="0"/>
+              <a:rPr lang="en-US" sz="3200" dirty="0"/>
               <a:t> </a:t>
             </a:r>
             <a:r>
-              <a:rPr lang="en-US" sz="2600" dirty="0" err="1"/>
+              <a:rPr lang="en-US" sz="3200" dirty="0" err="1"/>
               <a:t>página</a:t>
             </a:r>
             <a:r>
-              <a:rPr lang="en-US" sz="2600" dirty="0"/>
+              <a:rPr lang="en-US" sz="3200" dirty="0"/>
               <a:t> </a:t>
             </a:r>
             <a:r>
-              <a:rPr lang="en-US" sz="2600" dirty="0" err="1"/>
+              <a:rPr lang="en-US" sz="3200" dirty="0" err="1"/>
               <a:t>ou</a:t>
             </a:r>
             <a:r>
-              <a:rPr lang="en-US" sz="2600" dirty="0"/>
+              <a:rPr lang="en-US" sz="3200" dirty="0"/>
               <a:t> </a:t>
             </a:r>
             <a:r>
-              <a:rPr lang="en-US" sz="2600" dirty="0" err="1"/>
+              <a:rPr lang="en-US" sz="3200" dirty="0" err="1"/>
               <a:t>atualização</a:t>
             </a:r>
             <a:r>
-              <a:rPr lang="en-US" sz="2600" dirty="0"/>
+              <a:rPr lang="en-US" sz="3200" dirty="0"/>
               <a:t> de </a:t>
             </a:r>
             <a:r>
-              <a:rPr lang="en-US" sz="2600" dirty="0" err="1"/>
+              <a:rPr lang="en-US" sz="3200" dirty="0" err="1"/>
               <a:t>página</a:t>
             </a:r>
             <a:r>
-              <a:rPr lang="en-US" sz="2600" dirty="0"/>
+              <a:rPr lang="en-US" sz="3200" dirty="0"/>
               <a:t> </a:t>
             </a:r>
             <a:r>
-              <a:rPr lang="en-US" sz="2600" dirty="0" err="1"/>
+              <a:rPr lang="en-US" sz="3200" dirty="0" err="1"/>
               <a:t>solicitada</a:t>
             </a:r>
             <a:r>
-              <a:rPr lang="en-US" sz="2600" dirty="0"/>
+              <a:rPr lang="en-US" sz="3200" dirty="0"/>
               <a:t>)</a:t>
             </a:r>
-          </a:p>
-          <a:p>
-            <a:r>
-              <a:rPr lang="en-US" sz="2600" dirty="0" err="1"/>
-              <a:t>Apenas</a:t>
-            </a:r>
-            <a:r>
-              <a:rPr lang="en-US" sz="2600" dirty="0"/>
-              <a:t> </a:t>
-            </a:r>
-            <a:r>
-              <a:rPr lang="en-US" sz="2600" dirty="0" err="1"/>
-              <a:t>mensagens</a:t>
-            </a:r>
-            <a:r>
-              <a:rPr lang="en-US" sz="2600" dirty="0"/>
-              <a:t> com um </a:t>
-            </a:r>
-            <a:r>
-              <a:rPr lang="en-US" sz="2600" dirty="0" err="1"/>
-              <a:t>pequeno</a:t>
-            </a:r>
-            <a:r>
-              <a:rPr lang="en-US" sz="2600" dirty="0"/>
-              <a:t> </a:t>
-            </a:r>
-            <a:r>
-              <a:rPr lang="en-US" sz="2600" dirty="0" err="1"/>
-              <a:t>cabeçalho</a:t>
-            </a:r>
-            <a:r>
-              <a:rPr lang="en-US" sz="2600" dirty="0"/>
-              <a:t> WebSocket </a:t>
-            </a:r>
-            <a:r>
-              <a:rPr lang="en-US" sz="2600" dirty="0" err="1"/>
-              <a:t>são</a:t>
-            </a:r>
-            <a:r>
-              <a:rPr lang="en-US" sz="2600" dirty="0"/>
-              <a:t> </a:t>
-            </a:r>
-            <a:r>
-              <a:rPr lang="en-US" sz="2600" dirty="0" err="1"/>
-              <a:t>enviadas</a:t>
-            </a:r>
-            <a:r>
-              <a:rPr lang="en-US" sz="2600" dirty="0"/>
-              <a:t>, </a:t>
-            </a:r>
-            <a:r>
-              <a:rPr lang="en-US" sz="2600" dirty="0" err="1"/>
-              <a:t>tornando</a:t>
-            </a:r>
-            <a:r>
-              <a:rPr lang="en-US" sz="2600" dirty="0"/>
-              <a:t> </a:t>
-            </a:r>
-            <a:r>
-              <a:rPr lang="en-US" sz="2600" dirty="0" err="1"/>
-              <a:t>extremamente</a:t>
-            </a:r>
-            <a:r>
-              <a:rPr lang="en-US" sz="2600" dirty="0"/>
-              <a:t> </a:t>
-            </a:r>
-            <a:r>
-              <a:rPr lang="en-US" sz="2600" dirty="0" err="1"/>
-              <a:t>leve</a:t>
-            </a:r>
-            <a:r>
-              <a:rPr lang="en-US" sz="2600" dirty="0"/>
-              <a:t> e </a:t>
-            </a:r>
-            <a:r>
-              <a:rPr lang="en-US" sz="2600" dirty="0" err="1"/>
-              <a:t>rápido</a:t>
-            </a:r>
-            <a:r>
-              <a:rPr lang="en-US" sz="2600" dirty="0"/>
-              <a:t> e </a:t>
-            </a:r>
-            <a:r>
-              <a:rPr lang="en-US" sz="2600" dirty="0" err="1"/>
-              <a:t>eficiente</a:t>
-            </a:r>
-            <a:r>
-              <a:rPr lang="en-US" sz="2600" dirty="0"/>
-              <a:t> a </a:t>
-            </a:r>
-            <a:r>
-              <a:rPr lang="en-US" sz="2600" dirty="0" err="1"/>
-              <a:t>troca</a:t>
-            </a:r>
-            <a:r>
-              <a:rPr lang="en-US" sz="2600" dirty="0"/>
-              <a:t> de </a:t>
-            </a:r>
-            <a:r>
-              <a:rPr lang="en-US" sz="2600" dirty="0" err="1"/>
-              <a:t>mensagens</a:t>
-            </a:r>
-            <a:endParaRPr lang="en-US" sz="2600" dirty="0"/>
-          </a:p>
-          <a:p>
-            <a:r>
-              <a:rPr lang="en-US" sz="2600" dirty="0" err="1"/>
-              <a:t>Diferente</a:t>
-            </a:r>
-            <a:r>
-              <a:rPr lang="en-US" sz="2600" dirty="0"/>
-              <a:t> de sockets </a:t>
-            </a:r>
-            <a:r>
-              <a:rPr lang="en-US" sz="2600" dirty="0" err="1"/>
-              <a:t>tradicionais</a:t>
-            </a:r>
-            <a:r>
-              <a:rPr lang="en-US" sz="2600" dirty="0"/>
-              <a:t>, </a:t>
-            </a:r>
-            <a:r>
-              <a:rPr lang="en-US" sz="2600" dirty="0" err="1"/>
-              <a:t>como</a:t>
-            </a:r>
-            <a:r>
-              <a:rPr lang="en-US" sz="2600" dirty="0"/>
-              <a:t> </a:t>
-            </a:r>
-            <a:r>
-              <a:rPr lang="en-US" sz="2600" dirty="0" err="1"/>
-              <a:t>WebSockets</a:t>
-            </a:r>
-            <a:r>
-              <a:rPr lang="en-US" sz="2600" dirty="0"/>
-              <a:t> </a:t>
-            </a:r>
-            <a:r>
-              <a:rPr lang="en-US" sz="2600" dirty="0" err="1"/>
-              <a:t>reutilizam</a:t>
-            </a:r>
-            <a:r>
-              <a:rPr lang="en-US" sz="2600" dirty="0"/>
-              <a:t> a </a:t>
-            </a:r>
-            <a:r>
-              <a:rPr lang="en-US" sz="2600" dirty="0" err="1"/>
-              <a:t>conexão</a:t>
-            </a:r>
-            <a:r>
-              <a:rPr lang="en-US" sz="2600" dirty="0"/>
-              <a:t> HTTP </a:t>
-            </a:r>
-            <a:r>
-              <a:rPr lang="en-US" sz="2600" dirty="0" err="1"/>
-              <a:t>estabelecida</a:t>
-            </a:r>
-            <a:r>
-              <a:rPr lang="en-US" sz="2600" dirty="0"/>
-              <a:t> </a:t>
-            </a:r>
-            <a:r>
-              <a:rPr lang="en-US" sz="2600" dirty="0" err="1"/>
-              <a:t>normalmente</a:t>
-            </a:r>
-            <a:r>
-              <a:rPr lang="en-US" sz="2600" dirty="0"/>
-              <a:t> </a:t>
-            </a:r>
-            <a:r>
-              <a:rPr lang="en-US" sz="2600" dirty="0" err="1"/>
-              <a:t>na</a:t>
-            </a:r>
-            <a:r>
-              <a:rPr lang="en-US" sz="2600" dirty="0"/>
-              <a:t> porta 80, </a:t>
-            </a:r>
-            <a:r>
-              <a:rPr lang="en-US" sz="2600" dirty="0" err="1"/>
-              <a:t>não</a:t>
-            </a:r>
-            <a:r>
-              <a:rPr lang="en-US" sz="2600" dirty="0"/>
-              <a:t> </a:t>
-            </a:r>
-            <a:r>
-              <a:rPr lang="en-US" sz="2600" dirty="0" err="1"/>
-              <a:t>há</a:t>
-            </a:r>
-            <a:r>
-              <a:rPr lang="en-US" sz="2600" dirty="0"/>
-              <a:t> </a:t>
-            </a:r>
-            <a:r>
-              <a:rPr lang="en-US" sz="2600" dirty="0" err="1"/>
-              <a:t>problemas</a:t>
-            </a:r>
-            <a:r>
-              <a:rPr lang="en-US" sz="2600" dirty="0"/>
-              <a:t> com firewalls</a:t>
-            </a:r>
-          </a:p>
-          <a:p>
-            <a:r>
-              <a:rPr lang="en-US" sz="2600" dirty="0"/>
-              <a:t>A </a:t>
-            </a:r>
-            <a:r>
-              <a:rPr lang="en-US" sz="2600" dirty="0" err="1"/>
-              <a:t>leveza</a:t>
-            </a:r>
-            <a:r>
-              <a:rPr lang="en-US" sz="2600" dirty="0"/>
-              <a:t> e </a:t>
-            </a:r>
-            <a:r>
-              <a:rPr lang="en-US" sz="2600" dirty="0" err="1"/>
-              <a:t>rapidez</a:t>
-            </a:r>
-            <a:r>
-              <a:rPr lang="en-US" sz="2600" dirty="0"/>
-              <a:t> </a:t>
-            </a:r>
-            <a:r>
-              <a:rPr lang="en-US" sz="2600" dirty="0" err="1"/>
-              <a:t>na</a:t>
-            </a:r>
-            <a:r>
-              <a:rPr lang="en-US" sz="2600" dirty="0"/>
-              <a:t> </a:t>
-            </a:r>
-            <a:r>
-              <a:rPr lang="en-US" sz="2600" dirty="0" err="1"/>
-              <a:t>troca</a:t>
-            </a:r>
-            <a:r>
-              <a:rPr lang="en-US" sz="2600" dirty="0"/>
-              <a:t> de </a:t>
-            </a:r>
-            <a:r>
-              <a:rPr lang="en-US" sz="2600" dirty="0" err="1"/>
-              <a:t>mensagens</a:t>
-            </a:r>
-            <a:r>
-              <a:rPr lang="en-US" sz="2600" dirty="0"/>
-              <a:t> </a:t>
-            </a:r>
-            <a:r>
-              <a:rPr lang="en-US" sz="2600" dirty="0" err="1"/>
-              <a:t>ameniza</a:t>
-            </a:r>
-            <a:r>
-              <a:rPr lang="en-US" sz="2600" dirty="0"/>
-              <a:t> </a:t>
-            </a:r>
-            <a:r>
-              <a:rPr lang="en-US" sz="2600" dirty="0" err="1"/>
-              <a:t>problemas</a:t>
-            </a:r>
-            <a:r>
-              <a:rPr lang="en-US" sz="2600" dirty="0"/>
-              <a:t> de </a:t>
-            </a:r>
-            <a:r>
-              <a:rPr lang="en-US" sz="2600" dirty="0" err="1"/>
-              <a:t>escalabilidade</a:t>
-            </a:r>
-            <a:r>
-              <a:rPr lang="en-US" sz="2600" dirty="0"/>
-              <a:t> </a:t>
-            </a:r>
-            <a:r>
-              <a:rPr lang="en-US" sz="2600" dirty="0" err="1"/>
-              <a:t>geográfica</a:t>
-            </a:r>
-            <a:r>
-              <a:rPr lang="en-US" sz="2600" dirty="0"/>
-              <a:t> e de </a:t>
-            </a:r>
-            <a:r>
-              <a:rPr lang="en-US" sz="2600" dirty="0" err="1"/>
-              <a:t>tamanho</a:t>
-            </a:r>
-            <a:endParaRPr lang="en-US" sz="2600" dirty="0"/>
-          </a:p>
-          <a:p>
-            <a:endParaRPr lang="en-US" sz="2600" dirty="0"/>
-          </a:p>
-          <a:p>
-            <a:endParaRPr lang="pt-BR" sz="2600" dirty="0"/>
           </a:p>
         </p:txBody>
       </p:sp>
@@ -4698,14 +4432,57 @@
                             </p:stCondLst>
                             <p:childTnLst>
                               <p:par>
-                                <p:cTn id="10" presetID="9" presetClass="entr" presetSubtype="0" fill="hold" grpId="0" nodeType="clickEffect">
+                                <p:cTn id="10" presetID="9" presetClass="exit" presetSubtype="0" fill="hold" grpId="1" nodeType="clickEffect">
+                                  <p:stCondLst>
+                                    <p:cond delay="0"/>
+                                  </p:stCondLst>
+                                  <p:childTnLst>
+                                    <p:animEffect transition="out" filter="dissolve">
+                                      <p:cBhvr>
+                                        <p:cTn id="11" dur="500"/>
+                                        <p:tgtEl>
+                                          <p:spTgt spid="3">
+                                            <p:txEl>
+                                              <p:pRg st="0" end="0"/>
+                                            </p:txEl>
+                                          </p:spTgt>
+                                        </p:tgtEl>
+                                      </p:cBhvr>
+                                    </p:animEffect>
+                                    <p:set>
+                                      <p:cBhvr>
+                                        <p:cTn id="12" dur="1" fill="hold">
+                                          <p:stCondLst>
+                                            <p:cond delay="499"/>
+                                          </p:stCondLst>
+                                        </p:cTn>
+                                        <p:tgtEl>
+                                          <p:spTgt spid="3">
+                                            <p:txEl>
+                                              <p:pRg st="0" end="0"/>
+                                            </p:txEl>
+                                          </p:spTgt>
+                                        </p:tgtEl>
+                                        <p:attrNameLst>
+                                          <p:attrName>style.visibility</p:attrName>
+                                        </p:attrNameLst>
+                                      </p:cBhvr>
+                                      <p:to>
+                                        <p:strVal val="hidden"/>
+                                      </p:to>
+                                    </p:set>
+                                  </p:childTnLst>
+                                </p:cTn>
+                              </p:par>
+                              <p:par>
+                                <p:cTn id="13" presetID="9" presetClass="entr" presetSubtype="0" fill="hold" grpId="0" nodeType="withEffect">
                                   <p:stCondLst>
                                     <p:cond delay="0"/>
                                   </p:stCondLst>
                                   <p:childTnLst>
                                     <p:set>
                                       <p:cBhvr>
-                                        <p:cTn id="11" dur="1" fill="hold">
+                                        <p:cTn id="14" dur="1" fill="hold">
                                           <p:stCondLst>
                                             <p:cond delay="0"/>
                                           </p:stCondLst>
@@ -4727,7 +4504,7 @@
                                     </p:set>
                                     <p:animEffect transition="in" filter="dissolve">
                                       <p:cBhvr>
-                                        <p:cTn id="12" dur="500"/>
+                                        <p:cTn id="15" dur="500"/>
                                         <p:tgtEl>
                                           <p:spTgt spid="3">
                                             <p:txEl>
@@ -4747,26 +4524,69 @@
                     </p:cTn>
                   </p:par>
                   <p:par>
-                    <p:cTn id="13" fill="hold">
+                    <p:cTn id="16" fill="hold">
                       <p:stCondLst>
                         <p:cond delay="indefinite"/>
                       </p:stCondLst>
                       <p:childTnLst>
                         <p:par>
-                          <p:cTn id="14" fill="hold">
+                          <p:cTn id="17" fill="hold">
                             <p:stCondLst>
                               <p:cond delay="0"/>
                             </p:stCondLst>
                             <p:childTnLst>
                               <p:par>
-                                <p:cTn id="15" presetID="9" presetClass="entr" presetSubtype="0" fill="hold" grpId="0" nodeType="clickEffect">
+                                <p:cTn id="18" presetID="9" presetClass="exit" presetSubtype="0" fill="hold" grpId="1" nodeType="clickEffect">
+                                  <p:stCondLst>
+                                    <p:cond delay="0"/>
+                                  </p:stCondLst>
+                                  <p:childTnLst>
+                                    <p:animEffect transition="out" filter="dissolve">
+                                      <p:cBhvr>
+                                        <p:cTn id="19" dur="500"/>
+                                        <p:tgtEl>
+                                          <p:spTgt spid="3">
+                                            <p:txEl>
+                                              <p:pRg st="1" end="1"/>
+                                            </p:txEl>
+                                          </p:spTgt>
+                                        </p:tgtEl>
+                                      </p:cBhvr>
+                                    </p:animEffect>
+                                    <p:set>
+                                      <p:cBhvr>
+                                        <p:cTn id="20" dur="1" fill="hold">
+                                          <p:stCondLst>
+                                            <p:cond delay="499"/>
+                                          </p:stCondLst>
+                                        </p:cTn>
+                                        <p:tgtEl>
+                                          <p:spTgt spid="3">
+                                            <p:txEl>
+                                              <p:pRg st="1" end="1"/>
+                                            </p:txEl>
+                                          </p:spTgt>
+                                        </p:tgtEl>
+                                        <p:attrNameLst>
+                                          <p:attrName>style.visibility</p:attrName>
+                                        </p:attrNameLst>
+                                      </p:cBhvr>
+                                      <p:to>
+                                        <p:strVal val="hidden"/>
+                                      </p:to>
+                                    </p:set>
+                                  </p:childTnLst>
+                                </p:cTn>
+                              </p:par>
+                              <p:par>
+                                <p:cTn id="21" presetID="9" presetClass="entr" presetSubtype="0" fill="hold" grpId="0" nodeType="withEffect">
                                   <p:stCondLst>
                                     <p:cond delay="0"/>
                                   </p:stCondLst>
                                   <p:childTnLst>
                                     <p:set>
                                       <p:cBhvr>
-                                        <p:cTn id="16" dur="1" fill="hold">
+                                        <p:cTn id="22" dur="1" fill="hold">
                                           <p:stCondLst>
                                             <p:cond delay="0"/>
                                           </p:stCondLst>
@@ -4788,133 +4608,11 @@
                                     </p:set>
                                     <p:animEffect transition="in" filter="dissolve">
                                       <p:cBhvr>
-                                        <p:cTn id="17" dur="500"/>
+                                        <p:cTn id="23" dur="500"/>
                                         <p:tgtEl>
                                           <p:spTgt spid="3">
                                             <p:txEl>
                                               <p:pRg st="2" end="2"/>
-                                            </p:txEl>
-                                          </p:spTgt>
-                                        </p:tgtEl>
-                                      </p:cBhvr>
-                                    </p:animEffect>
-                                  </p:childTnLst>
-                                </p:cTn>
-                              </p:par>
-                            </p:childTnLst>
-                          </p:cTn>
-                        </p:par>
-                      </p:childTnLst>
-                    </p:cTn>
-                  </p:par>
-                  <p:par>
-                    <p:cTn id="18" fill="hold">
-                      <p:stCondLst>
-                        <p:cond delay="indefinite"/>
-                      </p:stCondLst>
-                      <p:childTnLst>
-                        <p:par>
-                          <p:cTn id="19" fill="hold">
-                            <p:stCondLst>
-                              <p:cond delay="0"/>
-                            </p:stCondLst>
-                            <p:childTnLst>
-                              <p:par>
-                                <p:cTn id="20" presetID="9" presetClass="entr" presetSubtype="0" fill="hold" grpId="0" nodeType="clickEffect">
-                                  <p:stCondLst>
-                                    <p:cond delay="0"/>
-                                  </p:stCondLst>
-                                  <p:childTnLst>
-                                    <p:set>
-                                      <p:cBhvr>
-                                        <p:cTn id="21" dur="1" fill="hold">
-                                          <p:stCondLst>
-                                            <p:cond delay="0"/>
-                                          </p:stCondLst>
-                                        </p:cTn>
-                                        <p:tgtEl>
-                                          <p:spTgt spid="3">
-                                            <p:txEl>
-                                              <p:pRg st="3" end="3"/>
-                                            </p:txEl>
-                                          </p:spTgt>
-                                        </p:tgtEl>
-                                        <p:attrNameLst>
-                                          <p:attrName>style.visibility</p:attrName>
-                                        </p:attrNameLst>
-                                      </p:cBhvr>
-                                      <p:to>
-                                        <p:strVal val="visible"/>
-                                      </p:to>
-                                    </p:set>
-                                    <p:animEffect transition="in" filter="dissolve">
-                                      <p:cBhvr>
-                                        <p:cTn id="22" dur="500"/>
-                                        <p:tgtEl>
-                                          <p:spTgt spid="3">
-                                            <p:txEl>
-                                              <p:pRg st="3" end="3"/>
-                                            </p:txEl>
-                                          </p:spTgt>
-                                        </p:tgtEl>
-                                      </p:cBhvr>
-                                    </p:animEffect>
-                                  </p:childTnLst>
-                                </p:cTn>
-                              </p:par>
-                            </p:childTnLst>
-                          </p:cTn>
-                        </p:par>
-                      </p:childTnLst>
-                    </p:cTn>
-                  </p:par>
-                  <p:par>
-                    <p:cTn id="23" fill="hold">
-                      <p:stCondLst>
-                        <p:cond delay="indefinite"/>
-                      </p:stCondLst>
-                      <p:childTnLst>
-                        <p:par>
-                          <p:cTn id="24" fill="hold">
-                            <p:stCondLst>
-                              <p:cond delay="0"/>
-                            </p:stCondLst>
-                            <p:childTnLst>
-                              <p:par>
-                                <p:cTn id="25" presetID="9" presetClass="entr" presetSubtype="0" fill="hold" grpId="0" nodeType="clickEffect">
-                                  <p:stCondLst>
-                                    <p:cond delay="0"/>
-                                  </p:stCondLst>
-                                  <p:childTnLst>
-                                    <p:set>
-                                      <p:cBhvr>
-                                        <p:cTn id="26" dur="1" fill="hold">
-                                          <p:stCondLst>
-                                            <p:cond delay="0"/>
-                                          </p:stCondLst>
-                                        </p:cTn>
-                                        <p:tgtEl>
-                                          <p:spTgt spid="3">
-                                            <p:txEl>
-                                              <p:pRg st="4" end="4"/>
-                                            </p:txEl>
-                                          </p:spTgt>
-                                        </p:tgtEl>
-                                        <p:attrNameLst>
-                                          <p:attrName>style.visibility</p:attrName>
-                                        </p:attrNameLst>
-                                      </p:cBhvr>
-                                      <p:to>
-                                        <p:strVal val="visible"/>
-                                      </p:to>
-                                    </p:set>
-                                    <p:animEffect transition="in" filter="dissolve">
-                                      <p:cBhvr>
-                                        <p:cTn id="27" dur="500"/>
-                                        <p:tgtEl>
-                                          <p:spTgt spid="3">
-                                            <p:txEl>
-                                              <p:pRg st="4" end="4"/>
                                             </p:txEl>
                                           </p:spTgt>
                                         </p:tgtEl>
@@ -4951,13 +4649,736 @@
       </p:par>
     </p:tnLst>
     <p:bldLst>
-      <p:bldP spid="3" grpId="0" build="p"/>
+      <p:bldP spid="3" grpId="0" uiExpand="1" build="p"/>
+      <p:bldP spid="3" grpId="1" uiExpand="1" build="p"/>
     </p:bldLst>
   </p:timing>
 </p:sld>
 </file>
 
 <file path=ppt/slides/slide4.xml><?xml version="1.0" encoding="utf-8"?>
+<p:sld xmlns:a="http://schemas.openxmlformats.org/drawingml/2006/main" xmlns:r="http://schemas.openxmlformats.org/officeDocument/2006/relationships" xmlns:p="http://schemas.openxmlformats.org/presentationml/2006/main">
+  <p:cSld>
+    <p:spTree>
+      <p:nvGrpSpPr>
+        <p:cNvPr id="1" name=""/>
+        <p:cNvGrpSpPr/>
+        <p:nvPr/>
+      </p:nvGrpSpPr>
+      <p:grpSpPr>
+        <a:xfrm>
+          <a:off x="0" y="0"/>
+          <a:ext cx="0" cy="0"/>
+          <a:chOff x="0" y="0"/>
+          <a:chExt cx="0" cy="0"/>
+        </a:xfrm>
+      </p:grpSpPr>
+      <p:sp>
+        <p:nvSpPr>
+          <p:cNvPr id="3" name="Content Placeholder 2">
+            <a:extLst>
+              <a:ext uri="{FF2B5EF4-FFF2-40B4-BE49-F238E27FC236}">
+                <a16:creationId xmlns:a16="http://schemas.microsoft.com/office/drawing/2014/main" id="{56B7BAEB-9907-DC45-A478-033AB322DAD1}"/>
+              </a:ext>
+            </a:extLst>
+          </p:cNvPr>
+          <p:cNvSpPr>
+            <a:spLocks noGrp="1"/>
+          </p:cNvSpPr>
+          <p:nvPr>
+            <p:ph idx="1"/>
+          </p:nvPr>
+        </p:nvSpPr>
+        <p:spPr>
+          <a:xfrm>
+            <a:off x="693683" y="1403135"/>
+            <a:ext cx="11067393" cy="5202621"/>
+          </a:xfrm>
+        </p:spPr>
+        <p:txBody>
+          <a:bodyPr>
+            <a:noAutofit/>
+          </a:bodyPr>
+          <a:lstStyle/>
+          <a:p>
+            <a:r>
+              <a:rPr lang="en-US" sz="3200" dirty="0" err="1"/>
+              <a:t>Apenas</a:t>
+            </a:r>
+            <a:r>
+              <a:rPr lang="en-US" sz="3200" dirty="0"/>
+              <a:t> </a:t>
+            </a:r>
+            <a:r>
+              <a:rPr lang="en-US" sz="3200" dirty="0" err="1"/>
+              <a:t>mensagens</a:t>
+            </a:r>
+            <a:r>
+              <a:rPr lang="en-US" sz="3200" dirty="0"/>
+              <a:t> com um </a:t>
+            </a:r>
+            <a:r>
+              <a:rPr lang="en-US" sz="3200" dirty="0" err="1"/>
+              <a:t>pequeno</a:t>
+            </a:r>
+            <a:r>
+              <a:rPr lang="en-US" sz="3200" dirty="0"/>
+              <a:t> </a:t>
+            </a:r>
+            <a:r>
+              <a:rPr lang="en-US" sz="3200" dirty="0" err="1"/>
+              <a:t>cabeçalho</a:t>
+            </a:r>
+            <a:r>
+              <a:rPr lang="en-US" sz="3200" dirty="0"/>
+              <a:t> WebSocket </a:t>
+            </a:r>
+            <a:r>
+              <a:rPr lang="en-US" sz="3200" dirty="0" err="1"/>
+              <a:t>são</a:t>
+            </a:r>
+            <a:r>
+              <a:rPr lang="en-US" sz="3200" dirty="0"/>
+              <a:t> </a:t>
+            </a:r>
+            <a:r>
+              <a:rPr lang="en-US" sz="3200" dirty="0" err="1"/>
+              <a:t>enviadas</a:t>
+            </a:r>
+            <a:r>
+              <a:rPr lang="en-US" sz="3200" dirty="0"/>
+              <a:t>, </a:t>
+            </a:r>
+            <a:r>
+              <a:rPr lang="en-US" sz="3200" dirty="0" err="1"/>
+              <a:t>tornando</a:t>
+            </a:r>
+            <a:r>
+              <a:rPr lang="en-US" sz="3200" dirty="0"/>
+              <a:t> </a:t>
+            </a:r>
+            <a:r>
+              <a:rPr lang="en-US" sz="3200" dirty="0" err="1"/>
+              <a:t>extremamente</a:t>
+            </a:r>
+            <a:r>
+              <a:rPr lang="en-US" sz="3200" dirty="0"/>
+              <a:t> </a:t>
+            </a:r>
+            <a:r>
+              <a:rPr lang="en-US" sz="3200" dirty="0" err="1"/>
+              <a:t>leve</a:t>
+            </a:r>
+            <a:r>
+              <a:rPr lang="en-US" sz="3200" dirty="0"/>
+              <a:t> e </a:t>
+            </a:r>
+            <a:r>
+              <a:rPr lang="en-US" sz="3200" dirty="0" err="1"/>
+              <a:t>rápido</a:t>
+            </a:r>
+            <a:r>
+              <a:rPr lang="en-US" sz="3200" dirty="0"/>
+              <a:t> e </a:t>
+            </a:r>
+            <a:r>
+              <a:rPr lang="en-US" sz="3200" dirty="0" err="1"/>
+              <a:t>eficiente</a:t>
+            </a:r>
+            <a:r>
+              <a:rPr lang="en-US" sz="3200" dirty="0"/>
+              <a:t> a </a:t>
+            </a:r>
+            <a:r>
+              <a:rPr lang="en-US" sz="3200" dirty="0" err="1"/>
+              <a:t>troca</a:t>
+            </a:r>
+            <a:r>
+              <a:rPr lang="en-US" sz="3200" dirty="0"/>
+              <a:t> de </a:t>
+            </a:r>
+            <a:r>
+              <a:rPr lang="en-US" sz="3200" dirty="0" err="1"/>
+              <a:t>mensagens</a:t>
+            </a:r>
+            <a:endParaRPr lang="en-US" sz="3200" dirty="0"/>
+          </a:p>
+          <a:p>
+            <a:r>
+              <a:rPr lang="en-US" sz="3200" dirty="0" err="1"/>
+              <a:t>Diferente</a:t>
+            </a:r>
+            <a:r>
+              <a:rPr lang="en-US" sz="3200" dirty="0"/>
+              <a:t> de sockets </a:t>
+            </a:r>
+            <a:r>
+              <a:rPr lang="en-US" sz="3200" dirty="0" err="1"/>
+              <a:t>tradicionais</a:t>
+            </a:r>
+            <a:r>
+              <a:rPr lang="en-US" sz="3200" dirty="0"/>
+              <a:t>, </a:t>
+            </a:r>
+            <a:r>
+              <a:rPr lang="en-US" sz="3200" dirty="0" err="1"/>
+              <a:t>como</a:t>
+            </a:r>
+            <a:r>
+              <a:rPr lang="en-US" sz="3200" dirty="0"/>
+              <a:t> </a:t>
+            </a:r>
+            <a:r>
+              <a:rPr lang="en-US" sz="3200" dirty="0" err="1"/>
+              <a:t>WebSockets</a:t>
+            </a:r>
+            <a:r>
+              <a:rPr lang="en-US" sz="3200" dirty="0"/>
+              <a:t> </a:t>
+            </a:r>
+            <a:r>
+              <a:rPr lang="en-US" sz="3200" dirty="0" err="1"/>
+              <a:t>reutilizam</a:t>
+            </a:r>
+            <a:r>
+              <a:rPr lang="en-US" sz="3200" dirty="0"/>
+              <a:t> a </a:t>
+            </a:r>
+            <a:r>
+              <a:rPr lang="en-US" sz="3200" dirty="0" err="1"/>
+              <a:t>conexão</a:t>
+            </a:r>
+            <a:r>
+              <a:rPr lang="en-US" sz="3200" dirty="0"/>
+              <a:t> HTTP </a:t>
+            </a:r>
+            <a:r>
+              <a:rPr lang="en-US" sz="3200" dirty="0" err="1"/>
+              <a:t>estabelecida</a:t>
+            </a:r>
+            <a:r>
+              <a:rPr lang="en-US" sz="3200" dirty="0"/>
+              <a:t> </a:t>
+            </a:r>
+            <a:r>
+              <a:rPr lang="en-US" sz="3200" dirty="0" err="1"/>
+              <a:t>normalmente</a:t>
+            </a:r>
+            <a:r>
+              <a:rPr lang="en-US" sz="3200" dirty="0"/>
+              <a:t> </a:t>
+            </a:r>
+            <a:r>
+              <a:rPr lang="en-US" sz="3200" dirty="0" err="1"/>
+              <a:t>na</a:t>
+            </a:r>
+            <a:r>
+              <a:rPr lang="en-US" sz="3200" dirty="0"/>
+              <a:t> porta 80, </a:t>
+            </a:r>
+            <a:r>
+              <a:rPr lang="en-US" sz="3200" dirty="0" err="1"/>
+              <a:t>não</a:t>
+            </a:r>
+            <a:r>
+              <a:rPr lang="en-US" sz="3200" dirty="0"/>
+              <a:t> </a:t>
+            </a:r>
+            <a:r>
+              <a:rPr lang="en-US" sz="3200" dirty="0" err="1"/>
+              <a:t>há</a:t>
+            </a:r>
+            <a:r>
+              <a:rPr lang="en-US" sz="3200" dirty="0"/>
+              <a:t> </a:t>
+            </a:r>
+            <a:r>
+              <a:rPr lang="en-US" sz="3200" dirty="0" err="1"/>
+              <a:t>problemas</a:t>
+            </a:r>
+            <a:r>
+              <a:rPr lang="en-US" sz="3200" dirty="0"/>
+              <a:t> com firewalls</a:t>
+            </a:r>
+          </a:p>
+          <a:p>
+            <a:r>
+              <a:rPr lang="en-US" sz="3200" dirty="0"/>
+              <a:t>A </a:t>
+            </a:r>
+            <a:r>
+              <a:rPr lang="en-US" sz="3200" dirty="0" err="1"/>
+              <a:t>leveza</a:t>
+            </a:r>
+            <a:r>
+              <a:rPr lang="en-US" sz="3200" dirty="0"/>
+              <a:t> e </a:t>
+            </a:r>
+            <a:r>
+              <a:rPr lang="en-US" sz="3200" dirty="0" err="1"/>
+              <a:t>rapidez</a:t>
+            </a:r>
+            <a:r>
+              <a:rPr lang="en-US" sz="3200" dirty="0"/>
+              <a:t> </a:t>
+            </a:r>
+            <a:r>
+              <a:rPr lang="en-US" sz="3200" dirty="0" err="1"/>
+              <a:t>na</a:t>
+            </a:r>
+            <a:r>
+              <a:rPr lang="en-US" sz="3200" dirty="0"/>
+              <a:t> </a:t>
+            </a:r>
+            <a:r>
+              <a:rPr lang="en-US" sz="3200" dirty="0" err="1"/>
+              <a:t>troca</a:t>
+            </a:r>
+            <a:r>
+              <a:rPr lang="en-US" sz="3200" dirty="0"/>
+              <a:t> de </a:t>
+            </a:r>
+            <a:r>
+              <a:rPr lang="en-US" sz="3200" dirty="0" err="1"/>
+              <a:t>mensagens</a:t>
+            </a:r>
+            <a:r>
+              <a:rPr lang="en-US" sz="3200" dirty="0"/>
+              <a:t> </a:t>
+            </a:r>
+            <a:r>
+              <a:rPr lang="en-US" sz="3200" dirty="0" err="1"/>
+              <a:t>ameniza</a:t>
+            </a:r>
+            <a:r>
+              <a:rPr lang="en-US" sz="3200" dirty="0"/>
+              <a:t> </a:t>
+            </a:r>
+            <a:r>
+              <a:rPr lang="en-US" sz="3200" dirty="0" err="1"/>
+              <a:t>problemas</a:t>
+            </a:r>
+            <a:r>
+              <a:rPr lang="en-US" sz="3200" dirty="0"/>
+              <a:t> de </a:t>
+            </a:r>
+            <a:r>
+              <a:rPr lang="en-US" sz="3200" dirty="0" err="1"/>
+              <a:t>escalabilidade</a:t>
+            </a:r>
+            <a:r>
+              <a:rPr lang="en-US" sz="3200" dirty="0"/>
+              <a:t> </a:t>
+            </a:r>
+            <a:r>
+              <a:rPr lang="en-US" sz="3200" dirty="0" err="1"/>
+              <a:t>geográfica</a:t>
+            </a:r>
+            <a:r>
+              <a:rPr lang="en-US" sz="3200" dirty="0"/>
+              <a:t> e de </a:t>
+            </a:r>
+            <a:r>
+              <a:rPr lang="en-US" sz="3200" dirty="0" err="1"/>
+              <a:t>tamanho</a:t>
+            </a:r>
+            <a:endParaRPr lang="en-US" sz="3200" dirty="0"/>
+          </a:p>
+        </p:txBody>
+      </p:sp>
+      <p:sp>
+        <p:nvSpPr>
+          <p:cNvPr id="4" name="Rectangle 3">
+            <a:extLst>
+              <a:ext uri="{FF2B5EF4-FFF2-40B4-BE49-F238E27FC236}">
+                <a16:creationId xmlns:a16="http://schemas.microsoft.com/office/drawing/2014/main" id="{AA712CCC-0F51-5147-857A-F33544398307}"/>
+              </a:ext>
+            </a:extLst>
+          </p:cNvPr>
+          <p:cNvSpPr/>
+          <p:nvPr/>
+        </p:nvSpPr>
+        <p:spPr>
+          <a:xfrm>
+            <a:off x="1056291" y="113777"/>
+            <a:ext cx="6219152" cy="1015663"/>
+          </a:xfrm>
+          <a:prstGeom prst="rect">
+            <a:avLst/>
+          </a:prstGeom>
+          <a:noFill/>
+        </p:spPr>
+        <p:txBody>
+          <a:bodyPr wrap="square" lIns="91440" tIns="45720" rIns="91440" bIns="45720">
+            <a:spAutoFit/>
+          </a:bodyPr>
+          <a:lstStyle/>
+          <a:p>
+            <a:r>
+              <a:rPr lang="en-US" sz="6000" b="1" cap="none" spc="0" dirty="0">
+                <a:ln w="0"/>
+                <a:solidFill>
+                  <a:schemeClr val="tx1"/>
+                </a:solidFill>
+                <a:effectLst>
+                  <a:outerShdw blurRad="38100" dist="19050" dir="2700000" algn="tl" rotWithShape="0">
+                    <a:schemeClr val="dk1">
+                      <a:alpha val="40000"/>
+                    </a:schemeClr>
+                  </a:outerShdw>
+                </a:effectLst>
+              </a:rPr>
+              <a:t>WebSocket</a:t>
+            </a:r>
+          </a:p>
+        </p:txBody>
+      </p:sp>
+      <p:pic>
+        <p:nvPicPr>
+          <p:cNvPr id="5" name="Picture 4">
+            <a:extLst>
+              <a:ext uri="{FF2B5EF4-FFF2-40B4-BE49-F238E27FC236}">
+                <a16:creationId xmlns:a16="http://schemas.microsoft.com/office/drawing/2014/main" id="{7D43C519-715D-D949-9095-5135B680E709}"/>
+              </a:ext>
+            </a:extLst>
+          </p:cNvPr>
+          <p:cNvPicPr>
+            <a:picLocks noChangeAspect="1"/>
+          </p:cNvPicPr>
+          <p:nvPr/>
+        </p:nvPicPr>
+        <p:blipFill>
+          <a:blip r:embed="rId2"/>
+          <a:stretch>
+            <a:fillRect/>
+          </a:stretch>
+        </p:blipFill>
+        <p:spPr>
+          <a:xfrm>
+            <a:off x="7059561" y="216864"/>
+            <a:ext cx="4089400" cy="889000"/>
+          </a:xfrm>
+          <a:prstGeom prst="rect">
+            <a:avLst/>
+          </a:prstGeom>
+        </p:spPr>
+      </p:pic>
+    </p:spTree>
+    <p:extLst>
+      <p:ext uri="{BB962C8B-B14F-4D97-AF65-F5344CB8AC3E}">
+        <p14:creationId xmlns:p14="http://schemas.microsoft.com/office/powerpoint/2010/main" val="3821595542"/>
+      </p:ext>
+    </p:extLst>
+  </p:cSld>
+  <p:clrMapOvr>
+    <a:masterClrMapping/>
+  </p:clrMapOvr>
+  <p:timing>
+    <p:tnLst>
+      <p:par>
+        <p:cTn id="1" dur="indefinite" restart="never" nodeType="tmRoot">
+          <p:childTnLst>
+            <p:seq concurrent="1" nextAc="seek">
+              <p:cTn id="2" dur="indefinite" nodeType="mainSeq">
+                <p:childTnLst>
+                  <p:par>
+                    <p:cTn id="3" fill="hold">
+                      <p:stCondLst>
+                        <p:cond delay="indefinite"/>
+                      </p:stCondLst>
+                      <p:childTnLst>
+                        <p:par>
+                          <p:cTn id="4" fill="hold">
+                            <p:stCondLst>
+                              <p:cond delay="0"/>
+                            </p:stCondLst>
+                            <p:childTnLst>
+                              <p:par>
+                                <p:cTn id="5" presetID="9" presetClass="entr" presetSubtype="0" fill="hold" grpId="0" nodeType="clickEffect">
+                                  <p:stCondLst>
+                                    <p:cond delay="0"/>
+                                  </p:stCondLst>
+                                  <p:childTnLst>
+                                    <p:set>
+                                      <p:cBhvr>
+                                        <p:cTn id="6" dur="1" fill="hold">
+                                          <p:stCondLst>
+                                            <p:cond delay="0"/>
+                                          </p:stCondLst>
+                                        </p:cTn>
+                                        <p:tgtEl>
+                                          <p:spTgt spid="3">
+                                            <p:txEl>
+                                              <p:pRg st="0" end="0"/>
+                                            </p:txEl>
+                                          </p:spTgt>
+                                        </p:tgtEl>
+                                        <p:attrNameLst>
+                                          <p:attrName>style.visibility</p:attrName>
+                                        </p:attrNameLst>
+                                      </p:cBhvr>
+                                      <p:to>
+                                        <p:strVal val="visible"/>
+                                      </p:to>
+                                    </p:set>
+                                    <p:animEffect transition="in" filter="dissolve">
+                                      <p:cBhvr>
+                                        <p:cTn id="7" dur="500"/>
+                                        <p:tgtEl>
+                                          <p:spTgt spid="3">
+                                            <p:txEl>
+                                              <p:pRg st="0" end="0"/>
+                                            </p:txEl>
+                                          </p:spTgt>
+                                        </p:tgtEl>
+                                      </p:cBhvr>
+                                    </p:animEffect>
+                                  </p:childTnLst>
+                                </p:cTn>
+                              </p:par>
+                            </p:childTnLst>
+                          </p:cTn>
+                        </p:par>
+                      </p:childTnLst>
+                    </p:cTn>
+                  </p:par>
+                  <p:par>
+                    <p:cTn id="8" fill="hold">
+                      <p:stCondLst>
+                        <p:cond delay="indefinite"/>
+                      </p:stCondLst>
+                      <p:childTnLst>
+                        <p:par>
+                          <p:cTn id="9" fill="hold">
+                            <p:stCondLst>
+                              <p:cond delay="0"/>
+                            </p:stCondLst>
+                            <p:childTnLst>
+                              <p:par>
+                                <p:cTn id="10" presetID="9" presetClass="exit" presetSubtype="0" fill="hold" nodeType="clickEffect">
+                                  <p:stCondLst>
+                                    <p:cond delay="0"/>
+                                  </p:stCondLst>
+                                  <p:childTnLst>
+                                    <p:animEffect transition="out" filter="dissolve">
+                                      <p:cBhvr>
+                                        <p:cTn id="11" dur="500"/>
+                                        <p:tgtEl>
+                                          <p:spTgt spid="3">
+                                            <p:txEl>
+                                              <p:pRg st="0" end="0"/>
+                                            </p:txEl>
+                                          </p:spTgt>
+                                        </p:tgtEl>
+                                      </p:cBhvr>
+                                    </p:animEffect>
+                                    <p:set>
+                                      <p:cBhvr>
+                                        <p:cTn id="12" dur="1" fill="hold">
+                                          <p:stCondLst>
+                                            <p:cond delay="499"/>
+                                          </p:stCondLst>
+                                        </p:cTn>
+                                        <p:tgtEl>
+                                          <p:spTgt spid="3">
+                                            <p:txEl>
+                                              <p:pRg st="0" end="0"/>
+                                            </p:txEl>
+                                          </p:spTgt>
+                                        </p:tgtEl>
+                                        <p:attrNameLst>
+                                          <p:attrName>style.visibility</p:attrName>
+                                        </p:attrNameLst>
+                                      </p:cBhvr>
+                                      <p:to>
+                                        <p:strVal val="hidden"/>
+                                      </p:to>
+                                    </p:set>
+                                  </p:childTnLst>
+                                </p:cTn>
+                              </p:par>
+                              <p:par>
+                                <p:cTn id="13" presetID="9" presetClass="entr" presetSubtype="0" fill="hold" grpId="0" nodeType="withEffect">
+                                  <p:stCondLst>
+                                    <p:cond delay="0"/>
+                                  </p:stCondLst>
+                                  <p:childTnLst>
+                                    <p:set>
+                                      <p:cBhvr>
+                                        <p:cTn id="14" dur="1" fill="hold">
+                                          <p:stCondLst>
+                                            <p:cond delay="0"/>
+                                          </p:stCondLst>
+                                        </p:cTn>
+                                        <p:tgtEl>
+                                          <p:spTgt spid="3">
+                                            <p:txEl>
+                                              <p:pRg st="1" end="1"/>
+                                            </p:txEl>
+                                          </p:spTgt>
+                                        </p:tgtEl>
+                                        <p:attrNameLst>
+                                          <p:attrName>style.visibility</p:attrName>
+                                        </p:attrNameLst>
+                                      </p:cBhvr>
+                                      <p:to>
+                                        <p:strVal val="visible"/>
+                                      </p:to>
+                                    </p:set>
+                                    <p:animEffect transition="in" filter="dissolve">
+                                      <p:cBhvr>
+                                        <p:cTn id="15" dur="500"/>
+                                        <p:tgtEl>
+                                          <p:spTgt spid="3">
+                                            <p:txEl>
+                                              <p:pRg st="1" end="1"/>
+                                            </p:txEl>
+                                          </p:spTgt>
+                                        </p:tgtEl>
+                                      </p:cBhvr>
+                                    </p:animEffect>
+                                  </p:childTnLst>
+                                </p:cTn>
+                              </p:par>
+                            </p:childTnLst>
+                          </p:cTn>
+                        </p:par>
+                      </p:childTnLst>
+                    </p:cTn>
+                  </p:par>
+                  <p:par>
+                    <p:cTn id="16" fill="hold">
+                      <p:stCondLst>
+                        <p:cond delay="indefinite"/>
+                      </p:stCondLst>
+                      <p:childTnLst>
+                        <p:par>
+                          <p:cTn id="17" fill="hold">
+                            <p:stCondLst>
+                              <p:cond delay="0"/>
+                            </p:stCondLst>
+                            <p:childTnLst>
+                              <p:par>
+                                <p:cTn id="18" presetID="9" presetClass="exit" presetSubtype="0" fill="hold" nodeType="clickEffect">
+                                  <p:stCondLst>
+                                    <p:cond delay="0"/>
+                                  </p:stCondLst>
+                                  <p:childTnLst>
+                                    <p:animEffect transition="out" filter="dissolve">
+                                      <p:cBhvr>
+                                        <p:cTn id="19" dur="500"/>
+                                        <p:tgtEl>
+                                          <p:spTgt spid="3">
+                                            <p:txEl>
+                                              <p:pRg st="1" end="1"/>
+                                            </p:txEl>
+                                          </p:spTgt>
+                                        </p:tgtEl>
+                                      </p:cBhvr>
+                                    </p:animEffect>
+                                    <p:set>
+                                      <p:cBhvr>
+                                        <p:cTn id="20" dur="1" fill="hold">
+                                          <p:stCondLst>
+                                            <p:cond delay="499"/>
+                                          </p:stCondLst>
+                                        </p:cTn>
+                                        <p:tgtEl>
+                                          <p:spTgt spid="3">
+                                            <p:txEl>
+                                              <p:pRg st="1" end="1"/>
+                                            </p:txEl>
+                                          </p:spTgt>
+                                        </p:tgtEl>
+                                        <p:attrNameLst>
+                                          <p:attrName>style.visibility</p:attrName>
+                                        </p:attrNameLst>
+                                      </p:cBhvr>
+                                      <p:to>
+                                        <p:strVal val="hidden"/>
+                                      </p:to>
+                                    </p:set>
+                                  </p:childTnLst>
+                                </p:cTn>
+                              </p:par>
+                              <p:par>
+                                <p:cTn id="21" presetID="9" presetClass="entr" presetSubtype="0" fill="hold" grpId="0" nodeType="withEffect">
+                                  <p:stCondLst>
+                                    <p:cond delay="0"/>
+                                  </p:stCondLst>
+                                  <p:childTnLst>
+                                    <p:set>
+                                      <p:cBhvr>
+                                        <p:cTn id="22" dur="1" fill="hold">
+                                          <p:stCondLst>
+                                            <p:cond delay="0"/>
+                                          </p:stCondLst>
+                                        </p:cTn>
+                                        <p:tgtEl>
+                                          <p:spTgt spid="3">
+                                            <p:txEl>
+                                              <p:pRg st="2" end="2"/>
+                                            </p:txEl>
+                                          </p:spTgt>
+                                        </p:tgtEl>
+                                        <p:attrNameLst>
+                                          <p:attrName>style.visibility</p:attrName>
+                                        </p:attrNameLst>
+                                      </p:cBhvr>
+                                      <p:to>
+                                        <p:strVal val="visible"/>
+                                      </p:to>
+                                    </p:set>
+                                    <p:animEffect transition="in" filter="dissolve">
+                                      <p:cBhvr>
+                                        <p:cTn id="23" dur="500"/>
+                                        <p:tgtEl>
+                                          <p:spTgt spid="3">
+                                            <p:txEl>
+                                              <p:pRg st="2" end="2"/>
+                                            </p:txEl>
+                                          </p:spTgt>
+                                        </p:tgtEl>
+                                      </p:cBhvr>
+                                    </p:animEffect>
+                                  </p:childTnLst>
+                                </p:cTn>
+                              </p:par>
+                            </p:childTnLst>
+                          </p:cTn>
+                        </p:par>
+                      </p:childTnLst>
+                    </p:cTn>
+                  </p:par>
+                </p:childTnLst>
+              </p:cTn>
+              <p:prevCondLst>
+                <p:cond evt="onPrev" delay="0">
+                  <p:tgtEl>
+                    <p:sldTgt/>
+                  </p:tgtEl>
+                </p:cond>
+              </p:prevCondLst>
+              <p:nextCondLst>
+                <p:cond evt="onNext" delay="0">
+                  <p:tgtEl>
+                    <p:sldTgt/>
+                  </p:tgtEl>
+                </p:cond>
+              </p:nextCondLst>
+            </p:seq>
+          </p:childTnLst>
+        </p:cTn>
+      </p:par>
+    </p:tnLst>
+    <p:bldLst>
+      <p:bldP spid="3" grpId="0" uiExpand="1" build="p"/>
+    </p:bldLst>
+  </p:timing>
+</p:sld>
+</file>
+
+<file path=ppt/slides/slide5.xml><?xml version="1.0" encoding="utf-8"?>
 <p:sld xmlns:a="http://schemas.openxmlformats.org/drawingml/2006/main" xmlns:r="http://schemas.openxmlformats.org/officeDocument/2006/relationships" xmlns:p="http://schemas.openxmlformats.org/presentationml/2006/main">
   <p:cSld>
     <p:spTree>

</xml_diff>